<commit_message>
Updated docs to proper format
</commit_message>
<xml_diff>
--- a/documents/EIC_initial_presentation.pptx
+++ b/documents/EIC_initial_presentation.pptx
@@ -18263,7 +18263,7 @@
                 <a:cs typeface="Times New Roman"/>
                 <a:sym typeface="Times New Roman"/>
               </a:rPr>
-              <a:t>EIC</a:t>
+              <a:t>EIC Goals/Overview</a:t>
             </a:r>
             <a:endParaRPr/>
           </a:p>
@@ -18702,7 +18702,7 @@
             <a:r>
               <a:t/>
             </a:r>
-            <a:endParaRPr sz="1800">
+            <a:endParaRPr sz="2400">
               <a:latin typeface="Times New Roman"/>
               <a:ea typeface="Times New Roman"/>
               <a:cs typeface="Times New Roman"/>
@@ -18710,7 +18710,7 @@
             </a:endParaRPr>
           </a:p>
           <a:p>
-            <a:pPr indent="0" lvl="0" marL="0" rtl="0" algn="l">
+            <a:pPr indent="-381000" lvl="0" marL="457200" rtl="0" algn="l">
               <a:lnSpc>
                 <a:spcPct val="115000"/>
               </a:lnSpc>
@@ -18720,163 +18720,78 @@
               <a:spcAft>
                 <a:spcPts val="0"/>
               </a:spcAft>
-              <a:buClr>
-                <a:schemeClr val="dk1"/>
-              </a:buClr>
-              <a:buSzPts val="1100"/>
-              <a:buFont typeface="Arial"/>
-              <a:buNone/>
+              <a:buSzPts val="2400"/>
+              <a:buFont typeface="Times New Roman"/>
+              <a:buChar char="•"/>
             </a:pPr>
             <a:r>
-              <a:rPr lang="en-US" sz="1800">
-                <a:latin typeface="Arial"/>
-                <a:ea typeface="Arial"/>
-                <a:cs typeface="Arial"/>
-                <a:sym typeface="Arial"/>
+              <a:rPr lang="en-US" sz="2400">
+                <a:latin typeface="Times New Roman"/>
+                <a:ea typeface="Times New Roman"/>
+                <a:cs typeface="Times New Roman"/>
+                <a:sym typeface="Times New Roman"/>
               </a:rPr>
-              <a:t>	(32) User story 1 ("As a developer, I need to have a basic knowledge of React in order to build a modern front end”)</a:t>
+              <a:t>As a user, I need to have a web app served to me so I can access the platform</a:t>
             </a:r>
-            <a:endParaRPr sz="1800">
+            <a:endParaRPr sz="2400">
+              <a:latin typeface="Times New Roman"/>
+              <a:ea typeface="Times New Roman"/>
+              <a:cs typeface="Times New Roman"/>
+              <a:sym typeface="Times New Roman"/>
+            </a:endParaRPr>
+          </a:p>
+          <a:p>
+            <a:pPr indent="-381000" lvl="0" marL="457200" rtl="0" algn="l">
+              <a:lnSpc>
+                <a:spcPct val="115000"/>
+              </a:lnSpc>
+              <a:spcBef>
+                <a:spcPts val="0"/>
+              </a:spcBef>
+              <a:spcAft>
+                <a:spcPts val="0"/>
+              </a:spcAft>
+              <a:buSzPts val="2400"/>
+              <a:buFont typeface="Times New Roman"/>
+              <a:buChar char="•"/>
+            </a:pPr>
+            <a:r>
+              <a:rPr lang="en-US" sz="2400">
+                <a:latin typeface="Times New Roman"/>
+                <a:ea typeface="Times New Roman"/>
+                <a:cs typeface="Times New Roman"/>
+                <a:sym typeface="Times New Roman"/>
+              </a:rPr>
+              <a:t>As a user, I need to have a UI so I can use the web app</a:t>
+            </a:r>
+            <a:endParaRPr sz="2400">
+              <a:latin typeface="Times New Roman"/>
+              <a:ea typeface="Times New Roman"/>
+              <a:cs typeface="Times New Roman"/>
+              <a:sym typeface="Times New Roman"/>
+            </a:endParaRPr>
+          </a:p>
+          <a:p>
+            <a:pPr indent="0" lvl="0" marL="457200" marR="0" rtl="0" algn="l">
+              <a:lnSpc>
+                <a:spcPct val="115000"/>
+              </a:lnSpc>
+              <a:spcBef>
+                <a:spcPts val="0"/>
+              </a:spcBef>
+              <a:spcAft>
+                <a:spcPts val="0"/>
+              </a:spcAft>
+              <a:buNone/>
+            </a:pPr>
+            <a:r>
+              <a:t/>
+            </a:r>
+            <a:endParaRPr sz="1100">
               <a:latin typeface="Arial"/>
               <a:ea typeface="Arial"/>
               <a:cs typeface="Arial"/>
               <a:sym typeface="Arial"/>
-            </a:endParaRPr>
-          </a:p>
-          <a:p>
-            <a:pPr indent="0" lvl="0" marL="0" rtl="0" algn="l">
-              <a:lnSpc>
-                <a:spcPct val="115000"/>
-              </a:lnSpc>
-              <a:spcBef>
-                <a:spcPts val="0"/>
-              </a:spcBef>
-              <a:spcAft>
-                <a:spcPts val="0"/>
-              </a:spcAft>
-              <a:buClr>
-                <a:schemeClr val="dk1"/>
-              </a:buClr>
-              <a:buSzPts val="1100"/>
-              <a:buFont typeface="Arial"/>
-              <a:buNone/>
-            </a:pPr>
-            <a:r>
-              <a:rPr lang="en-US" sz="1800">
-                <a:latin typeface="Arial"/>
-                <a:ea typeface="Arial"/>
-                <a:cs typeface="Arial"/>
-                <a:sym typeface="Arial"/>
-              </a:rPr>
-              <a:t>	(32) User story 2 (“As a developer, I need to have a basic knowledge of Express.js in order to build a modern back end”)</a:t>
-            </a:r>
-            <a:endParaRPr sz="1800">
-              <a:latin typeface="Arial"/>
-              <a:ea typeface="Arial"/>
-              <a:cs typeface="Arial"/>
-              <a:sym typeface="Arial"/>
-            </a:endParaRPr>
-          </a:p>
-          <a:p>
-            <a:pPr indent="0" lvl="0" marL="0" rtl="0" algn="l">
-              <a:lnSpc>
-                <a:spcPct val="115000"/>
-              </a:lnSpc>
-              <a:spcBef>
-                <a:spcPts val="0"/>
-              </a:spcBef>
-              <a:spcAft>
-                <a:spcPts val="0"/>
-              </a:spcAft>
-              <a:buClr>
-                <a:schemeClr val="dk1"/>
-              </a:buClr>
-              <a:buSzPts val="1100"/>
-              <a:buFont typeface="Arial"/>
-              <a:buNone/>
-            </a:pPr>
-            <a:r>
-              <a:rPr lang="en-US" sz="1800">
-                <a:latin typeface="Arial"/>
-                <a:ea typeface="Arial"/>
-                <a:cs typeface="Arial"/>
-                <a:sym typeface="Arial"/>
-              </a:rPr>
-              <a:t>     	(8) User story 3 (“As a developer, I need to have an initial database schema so there is cohesive design for the initial project prototype”)</a:t>
-            </a:r>
-            <a:endParaRPr sz="1800">
-              <a:latin typeface="Arial"/>
-              <a:ea typeface="Arial"/>
-              <a:cs typeface="Arial"/>
-              <a:sym typeface="Arial"/>
-            </a:endParaRPr>
-          </a:p>
-          <a:p>
-            <a:pPr indent="0" lvl="0" marL="0" rtl="0" algn="l">
-              <a:lnSpc>
-                <a:spcPct val="115000"/>
-              </a:lnSpc>
-              <a:spcBef>
-                <a:spcPts val="0"/>
-              </a:spcBef>
-              <a:spcAft>
-                <a:spcPts val="0"/>
-              </a:spcAft>
-              <a:buClr>
-                <a:schemeClr val="dk1"/>
-              </a:buClr>
-              <a:buSzPts val="1100"/>
-              <a:buFont typeface="Arial"/>
-              <a:buNone/>
-            </a:pPr>
-            <a:r>
-              <a:rPr lang="en-US" sz="1800">
-                <a:latin typeface="Arial"/>
-                <a:ea typeface="Arial"/>
-                <a:cs typeface="Arial"/>
-                <a:sym typeface="Arial"/>
-              </a:rPr>
-              <a:t>   	(8) User story 4 (“As a developer, I need to have a high-level UI plan in order to prototype the app”)</a:t>
-            </a:r>
-            <a:endParaRPr sz="1800">
-              <a:latin typeface="Arial"/>
-              <a:ea typeface="Arial"/>
-              <a:cs typeface="Arial"/>
-              <a:sym typeface="Arial"/>
-            </a:endParaRPr>
-          </a:p>
-          <a:p>
-            <a:pPr indent="0" lvl="0" marL="0" rtl="0" algn="l">
-              <a:lnSpc>
-                <a:spcPct val="115000"/>
-              </a:lnSpc>
-              <a:spcBef>
-                <a:spcPts val="0"/>
-              </a:spcBef>
-              <a:spcAft>
-                <a:spcPts val="0"/>
-              </a:spcAft>
-              <a:buClr>
-                <a:schemeClr val="dk1"/>
-              </a:buClr>
-              <a:buSzPts val="1100"/>
-              <a:buFont typeface="Arial"/>
-              <a:buNone/>
-            </a:pPr>
-            <a:r>
-              <a:rPr lang="en-US" sz="1800">
-                <a:latin typeface="Arial"/>
-                <a:ea typeface="Arial"/>
-                <a:cs typeface="Arial"/>
-                <a:sym typeface="Arial"/>
-              </a:rPr>
-              <a:t>    	(8) User story 5 (“As a team, we need to allow the front end React app to access data from the backend”)</a:t>
-            </a:r>
-            <a:endParaRPr sz="1800">
-              <a:latin typeface="Times New Roman"/>
-              <a:ea typeface="Times New Roman"/>
-              <a:cs typeface="Times New Roman"/>
-              <a:sym typeface="Times New Roman"/>
             </a:endParaRPr>
           </a:p>
         </p:txBody>
@@ -19202,7 +19117,7 @@
             </a:endParaRPr>
           </a:p>
           <a:p>
-            <a:pPr indent="0" lvl="0" marL="0" rtl="0" algn="l">
+            <a:pPr indent="-381000" lvl="0" marL="457200" rtl="0" algn="l">
               <a:lnSpc>
                 <a:spcPct val="115000"/>
               </a:lnSpc>
@@ -19212,12 +19127,9 @@
               <a:spcAft>
                 <a:spcPts val="0"/>
               </a:spcAft>
-              <a:buClr>
-                <a:schemeClr val="dk1"/>
-              </a:buClr>
-              <a:buSzPts val="1100"/>
-              <a:buFont typeface="Arial"/>
-              <a:buNone/>
+              <a:buSzPts val="2400"/>
+              <a:buFont typeface="Times New Roman"/>
+              <a:buChar char="•"/>
             </a:pPr>
             <a:r>
               <a:rPr lang="en-US" sz="2400">
@@ -19226,7 +19138,7 @@
                 <a:cs typeface="Times New Roman"/>
                 <a:sym typeface="Times New Roman"/>
               </a:rPr>
-              <a:t>(16) User story 6 ("As a student, I need to be able to create an account in order to use the platform”)</a:t>
+              <a:t>As a student, I need to be able to create an account in order to use the platform</a:t>
             </a:r>
             <a:endParaRPr sz="2400">
               <a:latin typeface="Times New Roman"/>
@@ -19236,7 +19148,7 @@
             </a:endParaRPr>
           </a:p>
           <a:p>
-            <a:pPr indent="0" lvl="0" marL="0" rtl="0" algn="l">
+            <a:pPr indent="-381000" lvl="0" marL="457200" rtl="0" algn="l">
               <a:lnSpc>
                 <a:spcPct val="115000"/>
               </a:lnSpc>
@@ -19246,12 +19158,9 @@
               <a:spcAft>
                 <a:spcPts val="0"/>
               </a:spcAft>
-              <a:buClr>
-                <a:schemeClr val="dk1"/>
-              </a:buClr>
-              <a:buSzPts val="1100"/>
-              <a:buFont typeface="Arial"/>
-              <a:buNone/>
+              <a:buSzPts val="2400"/>
+              <a:buFont typeface="Times New Roman"/>
+              <a:buChar char="•"/>
             </a:pPr>
             <a:r>
               <a:rPr lang="en-US" sz="2400">
@@ -19260,7 +19169,7 @@
                 <a:cs typeface="Times New Roman"/>
                 <a:sym typeface="Times New Roman"/>
               </a:rPr>
-              <a:t>(16) User story 7 ("As a buddy, I need to be able to create an account in order to use the platform”)</a:t>
+              <a:t>As a buddy, I need to be able to create an account in order to use the platform</a:t>
             </a:r>
             <a:endParaRPr sz="2400">
               <a:latin typeface="Times New Roman"/>
@@ -19270,7 +19179,7 @@
             </a:endParaRPr>
           </a:p>
           <a:p>
-            <a:pPr indent="0" lvl="0" marL="0" rtl="0" algn="l">
+            <a:pPr indent="-381000" lvl="0" marL="457200" marR="0" rtl="0" algn="l">
               <a:lnSpc>
                 <a:spcPct val="115000"/>
               </a:lnSpc>
@@ -19280,12 +19189,9 @@
               <a:spcAft>
                 <a:spcPts val="0"/>
               </a:spcAft>
-              <a:buClr>
-                <a:schemeClr val="dk1"/>
-              </a:buClr>
-              <a:buSzPts val="1100"/>
-              <a:buFont typeface="Arial"/>
-              <a:buNone/>
+              <a:buSzPts val="2400"/>
+              <a:buFont typeface="Times New Roman"/>
+              <a:buChar char="•"/>
             </a:pPr>
             <a:r>
               <a:rPr lang="en-US" sz="2400">
@@ -19294,7 +19200,7 @@
                 <a:cs typeface="Times New Roman"/>
                 <a:sym typeface="Times New Roman"/>
               </a:rPr>
-              <a:t>(16) User story 8 ("As a student, I need to be able to send requests to a buddy in order to obtain buddies”)</a:t>
+              <a:t>As a student, I need to be able to send requests to a buddy in order to obtain buddies</a:t>
             </a:r>
             <a:endParaRPr sz="2400">
               <a:latin typeface="Times New Roman"/>
@@ -19304,18 +19210,16 @@
             </a:endParaRPr>
           </a:p>
           <a:p>
-            <a:pPr indent="-163512" lvl="0" marL="341312" marR="0" rtl="0" algn="l">
-              <a:spcBef>
-                <a:spcPts val="560"/>
-              </a:spcBef>
-              <a:spcAft>
-                <a:spcPts val="0"/>
-              </a:spcAft>
-              <a:buClr>
-                <a:schemeClr val="dk1"/>
-              </a:buClr>
-              <a:buSzPts val="2800"/>
-              <a:buFont typeface="Arial"/>
+            <a:pPr indent="0" lvl="0" marL="457200" marR="0" rtl="0" algn="l">
+              <a:lnSpc>
+                <a:spcPct val="115000"/>
+              </a:lnSpc>
+              <a:spcBef>
+                <a:spcPts val="0"/>
+              </a:spcBef>
+              <a:spcAft>
+                <a:spcPts val="0"/>
+              </a:spcAft>
               <a:buNone/>
             </a:pPr>
             <a:r>
@@ -19651,7 +19555,7 @@
             </a:endParaRPr>
           </a:p>
           <a:p>
-            <a:pPr indent="0" lvl="0" marL="0" rtl="0" algn="l">
+            <a:pPr indent="-381000" lvl="0" marL="457200" rtl="0" algn="l">
               <a:lnSpc>
                 <a:spcPct val="115000"/>
               </a:lnSpc>
@@ -19661,12 +19565,9 @@
               <a:spcAft>
                 <a:spcPts val="0"/>
               </a:spcAft>
-              <a:buClr>
-                <a:schemeClr val="dk1"/>
-              </a:buClr>
-              <a:buSzPts val="1100"/>
-              <a:buFont typeface="Arial"/>
-              <a:buNone/>
+              <a:buSzPts val="2400"/>
+              <a:buFont typeface="Times New Roman"/>
+              <a:buChar char="•"/>
             </a:pPr>
             <a:r>
               <a:rPr lang="en-US" sz="2400">
@@ -19675,7 +19576,7 @@
                 <a:cs typeface="Times New Roman"/>
                 <a:sym typeface="Times New Roman"/>
               </a:rPr>
-              <a:t>(16)User story  9 (“As a student/buddy, I need to be able to send a request and accept/decline buddies”) </a:t>
+              <a:t>As a buddy, I need to be able to accept requests from students in order to be a buddy to them</a:t>
             </a:r>
             <a:endParaRPr sz="2400">
               <a:latin typeface="Times New Roman"/>
@@ -19685,7 +19586,7 @@
             </a:endParaRPr>
           </a:p>
           <a:p>
-            <a:pPr indent="0" lvl="0" marL="0" rtl="0" algn="l">
+            <a:pPr indent="-381000" lvl="0" marL="457200" rtl="0" algn="l">
               <a:lnSpc>
                 <a:spcPct val="115000"/>
               </a:lnSpc>
@@ -19695,12 +19596,9 @@
               <a:spcAft>
                 <a:spcPts val="0"/>
               </a:spcAft>
-              <a:buClr>
-                <a:schemeClr val="dk1"/>
-              </a:buClr>
-              <a:buSzPts val="1100"/>
-              <a:buFont typeface="Arial"/>
-              <a:buNone/>
+              <a:buSzPts val="2400"/>
+              <a:buFont typeface="Times New Roman"/>
+              <a:buChar char="•"/>
             </a:pPr>
             <a:r>
               <a:rPr lang="en-US" sz="2400">
@@ -19709,7 +19607,7 @@
                 <a:cs typeface="Times New Roman"/>
                 <a:sym typeface="Times New Roman"/>
               </a:rPr>
-              <a:t>(16)User story 10 (“As a student/buddy, I need to be able to view and create posts to the central resource page”)</a:t>
+              <a:t>As a student/buddy, I need to be able to view and create posts to the central resource page so that there is content there</a:t>
             </a:r>
             <a:endParaRPr sz="2400">
               <a:latin typeface="Times New Roman"/>
@@ -19719,7 +19617,7 @@
             </a:endParaRPr>
           </a:p>
           <a:p>
-            <a:pPr indent="0" lvl="0" marL="0" rtl="0" algn="l">
+            <a:pPr indent="-381000" lvl="0" marL="457200" rtl="0" algn="l">
               <a:lnSpc>
                 <a:spcPct val="115000"/>
               </a:lnSpc>
@@ -19729,12 +19627,9 @@
               <a:spcAft>
                 <a:spcPts val="0"/>
               </a:spcAft>
-              <a:buClr>
-                <a:schemeClr val="dk1"/>
-              </a:buClr>
-              <a:buSzPts val="1100"/>
-              <a:buFont typeface="Arial"/>
-              <a:buNone/>
+              <a:buSzPts val="2400"/>
+              <a:buFont typeface="Times New Roman"/>
+              <a:buChar char="•"/>
             </a:pPr>
             <a:r>
               <a:rPr lang="en-US" sz="2400">
@@ -19743,7 +19638,7 @@
                 <a:cs typeface="Times New Roman"/>
                 <a:sym typeface="Times New Roman"/>
               </a:rPr>
-              <a:t>(8)User story 11 (“As a  company, I need to be able to create an account”)  </a:t>
+              <a:t>As a company, I need to be able to create an account so that I can use the app</a:t>
             </a:r>
             <a:endParaRPr sz="2400">
               <a:latin typeface="Times New Roman"/>
@@ -20064,7 +19959,7 @@
               </a:rPr>
               <a:t>Sprint 4 user stories     </a:t>
             </a:r>
-            <a:endParaRPr sz="3000">
+            <a:endParaRPr sz="2400">
               <a:latin typeface="Times New Roman"/>
               <a:ea typeface="Times New Roman"/>
               <a:cs typeface="Times New Roman"/>
@@ -20072,7 +19967,7 @@
             </a:endParaRPr>
           </a:p>
           <a:p>
-            <a:pPr indent="0" lvl="0" marL="0" rtl="0" algn="l">
+            <a:pPr indent="-381000" lvl="0" marL="457200" marR="0" rtl="0" algn="l">
               <a:lnSpc>
                 <a:spcPct val="115000"/>
               </a:lnSpc>
@@ -20082,15 +19977,18 @@
               <a:spcAft>
                 <a:spcPts val="0"/>
               </a:spcAft>
-              <a:buClr>
-                <a:schemeClr val="dk1"/>
-              </a:buClr>
-              <a:buSzPts val="1100"/>
-              <a:buFont typeface="Arial"/>
-              <a:buNone/>
+              <a:buSzPts val="2400"/>
+              <a:buFont typeface="Times New Roman"/>
+              <a:buChar char="•"/>
             </a:pPr>
             <a:r>
-              <a:t/>
+              <a:rPr lang="en-US" sz="2400">
+                <a:latin typeface="Times New Roman"/>
+                <a:ea typeface="Times New Roman"/>
+                <a:cs typeface="Times New Roman"/>
+                <a:sym typeface="Times New Roman"/>
+              </a:rPr>
+              <a:t>As a company, I need to be able create contracts so that students see what I am looking for in a contractor.</a:t>
             </a:r>
             <a:endParaRPr sz="2400">
               <a:latin typeface="Times New Roman"/>
@@ -20100,7 +19998,7 @@
             </a:endParaRPr>
           </a:p>
           <a:p>
-            <a:pPr indent="0" lvl="0" marL="0" rtl="0" algn="l">
+            <a:pPr indent="-381000" lvl="0" marL="457200" marR="0" rtl="0" algn="l">
               <a:lnSpc>
                 <a:spcPct val="115000"/>
               </a:lnSpc>
@@ -20110,12 +20008,9 @@
               <a:spcAft>
                 <a:spcPts val="0"/>
               </a:spcAft>
-              <a:buClr>
-                <a:schemeClr val="dk1"/>
-              </a:buClr>
-              <a:buSzPts val="1100"/>
-              <a:buFont typeface="Arial"/>
-              <a:buNone/>
+              <a:buSzPts val="2400"/>
+              <a:buFont typeface="Times New Roman"/>
+              <a:buChar char="•"/>
             </a:pPr>
             <a:r>
               <a:rPr lang="en-US" sz="2400">
@@ -20124,7 +20019,7 @@
                 <a:cs typeface="Times New Roman"/>
                 <a:sym typeface="Times New Roman"/>
               </a:rPr>
-              <a:t>(16) User story 12 (“As a company, I need to be able create contracts for students to apply to”)</a:t>
+              <a:t>As a company, I need to be able to post to central resources page so that I can provide helpful resources to students/buddies</a:t>
             </a:r>
             <a:endParaRPr sz="2400">
               <a:latin typeface="Times New Roman"/>
@@ -20134,7 +20029,7 @@
             </a:endParaRPr>
           </a:p>
           <a:p>
-            <a:pPr indent="0" lvl="0" marL="0" rtl="0" algn="l">
+            <a:pPr indent="-381000" lvl="0" marL="457200" marR="0" rtl="0" algn="l">
               <a:lnSpc>
                 <a:spcPct val="115000"/>
               </a:lnSpc>
@@ -20144,12 +20039,9 @@
               <a:spcAft>
                 <a:spcPts val="0"/>
               </a:spcAft>
-              <a:buClr>
-                <a:schemeClr val="dk1"/>
-              </a:buClr>
-              <a:buSzPts val="1100"/>
-              <a:buFont typeface="Arial"/>
-              <a:buNone/>
+              <a:buSzPts val="2400"/>
+              <a:buFont typeface="Times New Roman"/>
+              <a:buChar char="•"/>
             </a:pPr>
             <a:r>
               <a:rPr lang="en-US" sz="2400">
@@ -20158,7 +20050,7 @@
                 <a:cs typeface="Times New Roman"/>
                 <a:sym typeface="Times New Roman"/>
               </a:rPr>
-              <a:t>(8) User story 13 (“As a company, I need to be able to post to central resources page”)</a:t>
+              <a:t>As a company, I need to be able to contact students that I’m interested in order to notify them of my interest</a:t>
             </a:r>
             <a:endParaRPr sz="2400">
               <a:latin typeface="Times New Roman"/>
@@ -20168,7 +20060,7 @@
             </a:endParaRPr>
           </a:p>
           <a:p>
-            <a:pPr indent="0" lvl="0" marL="0" rtl="0" algn="l">
+            <a:pPr indent="-381000" lvl="0" marL="457200" marR="0" rtl="0" algn="l">
               <a:lnSpc>
                 <a:spcPct val="115000"/>
               </a:lnSpc>
@@ -20178,12 +20070,9 @@
               <a:spcAft>
                 <a:spcPts val="0"/>
               </a:spcAft>
-              <a:buClr>
-                <a:schemeClr val="dk1"/>
-              </a:buClr>
-              <a:buSzPts val="1100"/>
-              <a:buFont typeface="Arial"/>
-              <a:buNone/>
+              <a:buSzPts val="2400"/>
+              <a:buFont typeface="Times New Roman"/>
+              <a:buChar char="•"/>
             </a:pPr>
             <a:r>
               <a:rPr lang="en-US" sz="2400">
@@ -20192,41 +20081,7 @@
                 <a:cs typeface="Times New Roman"/>
                 <a:sym typeface="Times New Roman"/>
               </a:rPr>
-              <a:t>(4) User story 14 (“As a company, I need to be able to contact students that they are interested in”)</a:t>
-            </a:r>
-            <a:endParaRPr sz="2400">
-              <a:latin typeface="Times New Roman"/>
-              <a:ea typeface="Times New Roman"/>
-              <a:cs typeface="Times New Roman"/>
-              <a:sym typeface="Times New Roman"/>
-            </a:endParaRPr>
-          </a:p>
-          <a:p>
-            <a:pPr indent="0" lvl="0" marL="0" rtl="0" algn="l">
-              <a:lnSpc>
-                <a:spcPct val="115000"/>
-              </a:lnSpc>
-              <a:spcBef>
-                <a:spcPts val="0"/>
-              </a:spcBef>
-              <a:spcAft>
-                <a:spcPts val="0"/>
-              </a:spcAft>
-              <a:buClr>
-                <a:schemeClr val="dk1"/>
-              </a:buClr>
-              <a:buSzPts val="1100"/>
-              <a:buFont typeface="Arial"/>
-              <a:buNone/>
-            </a:pPr>
-            <a:r>
-              <a:rPr lang="en-US" sz="2400">
-                <a:latin typeface="Times New Roman"/>
-                <a:ea typeface="Times New Roman"/>
-                <a:cs typeface="Times New Roman"/>
-                <a:sym typeface="Times New Roman"/>
-              </a:rPr>
-              <a:t>(4) User story 15 (“As a student, I need the ability to contact companies that I am interested in”)</a:t>
+              <a:t>As a student, I need the ability to contact companies that I am interested in order to apply for contracts</a:t>
             </a:r>
             <a:endParaRPr sz="2400">
               <a:latin typeface="Times New Roman"/>
@@ -21362,13 +21217,15 @@
               </a:rPr>
               <a:t>React JS (Front-End)</a:t>
             </a:r>
-            <a:endParaRPr/>
+            <a:endParaRPr sz="2000">
+              <a:latin typeface="Times New Roman"/>
+              <a:ea typeface="Times New Roman"/>
+              <a:cs typeface="Times New Roman"/>
+              <a:sym typeface="Times New Roman"/>
+            </a:endParaRPr>
           </a:p>
           <a:p>
-            <a:pPr indent="0" lvl="0" marL="0" marR="0" rtl="0" algn="l">
-              <a:lnSpc>
-                <a:spcPct val="100000"/>
-              </a:lnSpc>
+            <a:pPr indent="0" lvl="0" marL="0" rtl="0" algn="l">
               <a:spcBef>
                 <a:spcPts val="640"/>
               </a:spcBef>
@@ -21383,10 +21240,7 @@
               <a:buNone/>
             </a:pPr>
             <a:r>
-              <a:rPr b="0" i="0" lang="en-US" sz="3200" u="none">
-                <a:solidFill>
-                  <a:schemeClr val="dk1"/>
-                </a:solidFill>
+              <a:rPr lang="en-US">
                 <a:latin typeface="Times New Roman"/>
                 <a:ea typeface="Times New Roman"/>
                 <a:cs typeface="Times New Roman"/>
@@ -21401,6 +21255,73 @@
                 <a:cs typeface="Times New Roman"/>
                 <a:sym typeface="Times New Roman"/>
               </a:rPr>
+              <a:t>HTML/CSS (Front-End)</a:t>
+            </a:r>
+            <a:endParaRPr sz="2000">
+              <a:latin typeface="Times New Roman"/>
+              <a:ea typeface="Times New Roman"/>
+              <a:cs typeface="Times New Roman"/>
+              <a:sym typeface="Times New Roman"/>
+            </a:endParaRPr>
+          </a:p>
+          <a:p>
+            <a:pPr indent="0" lvl="0" marL="0" marR="0" rtl="0" algn="l">
+              <a:lnSpc>
+                <a:spcPct val="100000"/>
+              </a:lnSpc>
+              <a:spcBef>
+                <a:spcPts val="640"/>
+              </a:spcBef>
+              <a:spcAft>
+                <a:spcPts val="0"/>
+              </a:spcAft>
+              <a:buClr>
+                <a:schemeClr val="dk1"/>
+              </a:buClr>
+              <a:buSzPts val="3200"/>
+              <a:buFont typeface="Arial"/>
+              <a:buNone/>
+            </a:pPr>
+            <a:r>
+              <a:rPr b="0" i="0" lang="en-US" sz="3200" u="none">
+                <a:solidFill>
+                  <a:schemeClr val="dk1"/>
+                </a:solidFill>
+                <a:latin typeface="Times New Roman"/>
+                <a:ea typeface="Times New Roman"/>
+                <a:cs typeface="Times New Roman"/>
+                <a:sym typeface="Times New Roman"/>
+              </a:rPr>
+              <a:t>Technology </a:t>
+            </a:r>
+            <a:r>
+              <a:rPr lang="en-US">
+                <a:latin typeface="Times New Roman"/>
+                <a:ea typeface="Times New Roman"/>
+                <a:cs typeface="Times New Roman"/>
+                <a:sym typeface="Times New Roman"/>
+              </a:rPr>
+              <a:t>3</a:t>
+            </a:r>
+            <a:r>
+              <a:rPr b="0" i="0" lang="en-US" sz="3200" u="none">
+                <a:solidFill>
+                  <a:schemeClr val="dk1"/>
+                </a:solidFill>
+                <a:latin typeface="Times New Roman"/>
+                <a:ea typeface="Times New Roman"/>
+                <a:cs typeface="Times New Roman"/>
+                <a:sym typeface="Times New Roman"/>
+              </a:rPr>
+              <a:t> </a:t>
+            </a:r>
+            <a:r>
+              <a:rPr lang="en-US" sz="2000">
+                <a:latin typeface="Times New Roman"/>
+                <a:ea typeface="Times New Roman"/>
+                <a:cs typeface="Times New Roman"/>
+                <a:sym typeface="Times New Roman"/>
+              </a:rPr>
               <a:t>Express JS (Back-End)</a:t>
             </a:r>
             <a:endParaRPr/>
@@ -21433,7 +21354,28 @@
                 <a:cs typeface="Times New Roman"/>
                 <a:sym typeface="Times New Roman"/>
               </a:rPr>
-              <a:t>Technology 3 </a:t>
+              <a:t>Technology </a:t>
+            </a:r>
+            <a:r>
+              <a:rPr lang="en-US">
+                <a:latin typeface="Times New Roman"/>
+                <a:ea typeface="Times New Roman"/>
+                <a:cs typeface="Times New Roman"/>
+                <a:sym typeface="Times New Roman"/>
+              </a:rPr>
+              <a:t>4</a:t>
+            </a:r>
+            <a:r>
+              <a:rPr b="0" i="0" lang="en-US" sz="3200" u="none">
+                <a:solidFill>
+                  <a:schemeClr val="dk1"/>
+                </a:solidFill>
+                <a:latin typeface="Times New Roman"/>
+                <a:ea typeface="Times New Roman"/>
+                <a:cs typeface="Times New Roman"/>
+                <a:sym typeface="Times New Roman"/>
+              </a:rPr>
+              <a:t> </a:t>
             </a:r>
             <a:r>
               <a:rPr lang="en-US" sz="2000">
@@ -21573,6 +21515,285 @@
 </file>
 
 <file path=ppt/theme/theme1.xml><?xml version="1.0" encoding="utf-8"?>
+<a:theme xmlns:a="http://schemas.openxmlformats.org/drawingml/2006/main" xmlns:r="http://schemas.openxmlformats.org/officeDocument/2006/relationships">
+  <a:themeElements>
+    <a:clrScheme name="Default">
+      <a:dk1>
+        <a:srgbClr val="000000"/>
+      </a:dk1>
+      <a:lt1>
+        <a:srgbClr val="FFFFFF"/>
+      </a:lt1>
+      <a:dk2>
+        <a:srgbClr val="158158"/>
+      </a:dk2>
+      <a:lt2>
+        <a:srgbClr val="F3F3F3"/>
+      </a:lt2>
+      <a:accent1>
+        <a:srgbClr val="058DC7"/>
+      </a:accent1>
+      <a:accent2>
+        <a:srgbClr val="50B432"/>
+      </a:accent2>
+      <a:accent3>
+        <a:srgbClr val="ED561B"/>
+      </a:accent3>
+      <a:accent4>
+        <a:srgbClr val="EDEF00"/>
+      </a:accent4>
+      <a:accent5>
+        <a:srgbClr val="24CBE5"/>
+      </a:accent5>
+      <a:accent6>
+        <a:srgbClr val="64E572"/>
+      </a:accent6>
+      <a:hlink>
+        <a:srgbClr val="2200CC"/>
+      </a:hlink>
+      <a:folHlink>
+        <a:srgbClr val="551A8B"/>
+      </a:folHlink>
+    </a:clrScheme>
+    <a:fontScheme name="Office">
+      <a:majorFont>
+        <a:latin typeface="Arial"/>
+        <a:ea typeface=""/>
+        <a:cs typeface=""/>
+        <a:font script="Jpan" typeface="ＭＳ Ｐゴシック"/>
+        <a:font script="Hang" typeface="맑은 고딕"/>
+        <a:font script="Hans" typeface="宋体"/>
+        <a:font script="Hant" typeface="新細明體"/>
+        <a:font script="Arab" typeface="Times New Roman"/>
+        <a:font script="Hebr" typeface="Times New Roman"/>
+        <a:font script="Thai" typeface="Angsana New"/>
+        <a:font script="Ethi" typeface="Nyala"/>
+        <a:font script="Beng" typeface="Vrinda"/>
+        <a:font script="Gujr" typeface="Shruti"/>
+        <a:font script="Khmr" typeface="MoolBoran"/>
+        <a:font script="Knda" typeface="Tunga"/>
+        <a:font script="Guru" typeface="Raavi"/>
+        <a:font script="Cans" typeface="Euphemia"/>
+        <a:font script="Cher" typeface="Plantagenet Cherokee"/>
+        <a:font script="Yiii" typeface="Microsoft Yi Baiti"/>
+        <a:font script="Tibt" typeface="Microsoft Himalaya"/>
+        <a:font script="Thaa" typeface="MV Boli"/>
+        <a:font script="Deva" typeface="Mangal"/>
+        <a:font script="Telu" typeface="Gautami"/>
+        <a:font script="Taml" typeface="Latha"/>
+        <a:font script="Syrc" typeface="Estrangelo Edessa"/>
+        <a:font script="Orya" typeface="Kalinga"/>
+        <a:font script="Mlym" typeface="Kartika"/>
+        <a:font script="Laoo" typeface="DokChampa"/>
+        <a:font script="Sinh" typeface="Iskoola Pota"/>
+        <a:font script="Mong" typeface="Mongolian Baiti"/>
+        <a:font script="Viet" typeface="Times New Roman"/>
+        <a:font script="Uigh" typeface="Microsoft Uighur"/>
+        <a:font script="Geor" typeface="Sylfaen"/>
+      </a:majorFont>
+      <a:minorFont>
+        <a:latin typeface="Arial"/>
+        <a:ea typeface=""/>
+        <a:cs typeface=""/>
+        <a:font script="Jpan" typeface="ＭＳ Ｐゴシック"/>
+        <a:font script="Hang" typeface="맑은 고딕"/>
+        <a:font script="Hans" typeface="宋体"/>
+        <a:font script="Hant" typeface="新細明體"/>
+        <a:font script="Arab" typeface="Arial"/>
+        <a:font script="Hebr" typeface="Arial"/>
+        <a:font script="Thai" typeface="Cordia New"/>
+        <a:font script="Ethi" typeface="Nyala"/>
+        <a:font script="Beng" typeface="Vrinda"/>
+        <a:font script="Gujr" typeface="Shruti"/>
+        <a:font script="Khmr" typeface="DaunPenh"/>
+        <a:font script="Knda" typeface="Tunga"/>
+        <a:font script="Guru" typeface="Raavi"/>
+        <a:font script="Cans" typeface="Euphemia"/>
+        <a:font script="Cher" typeface="Plantagenet Cherokee"/>
+        <a:font script="Yiii" typeface="Microsoft Yi Baiti"/>
+        <a:font script="Tibt" typeface="Microsoft Himalaya"/>
+        <a:font script="Thaa" typeface="MV Boli"/>
+        <a:font script="Deva" typeface="Mangal"/>
+        <a:font script="Telu" typeface="Gautami"/>
+        <a:font script="Taml" typeface="Latha"/>
+        <a:font script="Syrc" typeface="Estrangelo Edessa"/>
+        <a:font script="Orya" typeface="Kalinga"/>
+        <a:font script="Mlym" typeface="Kartika"/>
+        <a:font script="Laoo" typeface="DokChampa"/>
+        <a:font script="Sinh" typeface="Iskoola Pota"/>
+        <a:font script="Mong" typeface="Mongolian Baiti"/>
+        <a:font script="Viet" typeface="Arial"/>
+        <a:font script="Uigh" typeface="Microsoft Uighur"/>
+        <a:font script="Geor" typeface="Sylfaen"/>
+      </a:minorFont>
+    </a:fontScheme>
+    <a:fmtScheme name="Office">
+      <a:fillStyleLst>
+        <a:solidFill>
+          <a:schemeClr val="phClr"/>
+        </a:solidFill>
+        <a:gradFill rotWithShape="1">
+          <a:gsLst>
+            <a:gs pos="0">
+              <a:schemeClr val="phClr">
+                <a:tint val="50000"/>
+                <a:satMod val="300000"/>
+              </a:schemeClr>
+            </a:gs>
+            <a:gs pos="35000">
+              <a:schemeClr val="phClr">
+                <a:tint val="37000"/>
+                <a:satMod val="300000"/>
+              </a:schemeClr>
+            </a:gs>
+            <a:gs pos="100000">
+              <a:schemeClr val="phClr">
+                <a:tint val="15000"/>
+                <a:satMod val="350000"/>
+              </a:schemeClr>
+            </a:gs>
+          </a:gsLst>
+          <a:lin ang="16200000" scaled="1"/>
+        </a:gradFill>
+        <a:gradFill rotWithShape="1">
+          <a:gsLst>
+            <a:gs pos="0">
+              <a:schemeClr val="phClr">
+                <a:tint val="100000"/>
+                <a:shade val="100000"/>
+                <a:satMod val="130000"/>
+              </a:schemeClr>
+            </a:gs>
+            <a:gs pos="100000">
+              <a:schemeClr val="phClr">
+                <a:tint val="50000"/>
+                <a:shade val="100000"/>
+                <a:satMod val="350000"/>
+              </a:schemeClr>
+            </a:gs>
+          </a:gsLst>
+          <a:lin ang="16200000" scaled="0"/>
+        </a:gradFill>
+      </a:fillStyleLst>
+      <a:lnStyleLst>
+        <a:ln w="9525" cap="flat" cmpd="sng" algn="ctr">
+          <a:solidFill>
+            <a:schemeClr val="phClr">
+              <a:shade val="95000"/>
+              <a:satMod val="105000"/>
+            </a:schemeClr>
+          </a:solidFill>
+          <a:prstDash val="solid"/>
+        </a:ln>
+        <a:ln w="25400" cap="flat" cmpd="sng" algn="ctr">
+          <a:solidFill>
+            <a:schemeClr val="phClr"/>
+          </a:solidFill>
+          <a:prstDash val="solid"/>
+        </a:ln>
+        <a:ln w="38100" cap="flat" cmpd="sng" algn="ctr">
+          <a:solidFill>
+            <a:schemeClr val="phClr"/>
+          </a:solidFill>
+          <a:prstDash val="solid"/>
+        </a:ln>
+      </a:lnStyleLst>
+      <a:effectStyleLst>
+        <a:effectStyle>
+          <a:effectLst>
+            <a:outerShdw blurRad="40000" dist="20000" dir="5400000" rotWithShape="0">
+              <a:srgbClr val="000000">
+                <a:alpha val="38000"/>
+              </a:srgbClr>
+            </a:outerShdw>
+          </a:effectLst>
+        </a:effectStyle>
+        <a:effectStyle>
+          <a:effectLst>
+            <a:outerShdw blurRad="40000" dist="23000" dir="5400000" rotWithShape="0">
+              <a:srgbClr val="000000">
+                <a:alpha val="35000"/>
+              </a:srgbClr>
+            </a:outerShdw>
+          </a:effectLst>
+        </a:effectStyle>
+        <a:effectStyle>
+          <a:effectLst>
+            <a:outerShdw blurRad="40000" dist="23000" dir="5400000" rotWithShape="0">
+              <a:srgbClr val="000000">
+                <a:alpha val="35000"/>
+              </a:srgbClr>
+            </a:outerShdw>
+          </a:effectLst>
+          <a:scene3d>
+            <a:camera prst="orthographicFront">
+              <a:rot lat="0" lon="0" rev="0"/>
+            </a:camera>
+            <a:lightRig rig="threePt" dir="t">
+              <a:rot lat="0" lon="0" rev="1200000"/>
+            </a:lightRig>
+          </a:scene3d>
+          <a:sp3d>
+            <a:bevelT w="63500" h="25400"/>
+          </a:sp3d>
+        </a:effectStyle>
+      </a:effectStyleLst>
+      <a:bgFillStyleLst>
+        <a:solidFill>
+          <a:schemeClr val="phClr"/>
+        </a:solidFill>
+        <a:gradFill rotWithShape="1">
+          <a:gsLst>
+            <a:gs pos="0">
+              <a:schemeClr val="phClr">
+                <a:tint val="40000"/>
+                <a:satMod val="350000"/>
+              </a:schemeClr>
+            </a:gs>
+            <a:gs pos="40000">
+              <a:schemeClr val="phClr">
+                <a:tint val="45000"/>
+                <a:shade val="99000"/>
+                <a:satMod val="350000"/>
+              </a:schemeClr>
+            </a:gs>
+            <a:gs pos="100000">
+              <a:schemeClr val="phClr">
+                <a:shade val="20000"/>
+                <a:satMod val="255000"/>
+              </a:schemeClr>
+            </a:gs>
+          </a:gsLst>
+          <a:path path="circle">
+            <a:fillToRect l="50000" t="-80000" r="50000" b="180000"/>
+          </a:path>
+        </a:gradFill>
+        <a:gradFill rotWithShape="1">
+          <a:gsLst>
+            <a:gs pos="0">
+              <a:schemeClr val="phClr">
+                <a:tint val="80000"/>
+                <a:satMod val="300000"/>
+              </a:schemeClr>
+            </a:gs>
+            <a:gs pos="100000">
+              <a:schemeClr val="phClr">
+                <a:shade val="30000"/>
+                <a:satMod val="200000"/>
+              </a:schemeClr>
+            </a:gs>
+          </a:gsLst>
+          <a:path path="circle">
+            <a:fillToRect l="50000" t="50000" r="50000" b="50000"/>
+          </a:path>
+        </a:gradFill>
+      </a:bgFillStyleLst>
+    </a:fmtScheme>
+  </a:themeElements>
+</a:theme>
+</file>
+
+<file path=ppt/theme/theme2.xml><?xml version="1.0" encoding="utf-8"?>
 <a:theme xmlns:a="http://schemas.openxmlformats.org/drawingml/2006/main" xmlns:r="http://schemas.openxmlformats.org/officeDocument/2006/relationships" name="Office Theme">
   <a:themeElements>
     <a:clrScheme name="Office">
@@ -21849,283 +22070,4 @@
     </a:fmtScheme>
   </a:themeElements>
 </a:theme>
-</file>
-
-<file path=ppt/theme/theme2.xml><?xml version="1.0" encoding="utf-8"?>
-<a:theme xmlns:a="http://schemas.openxmlformats.org/drawingml/2006/main" xmlns:r="http://schemas.openxmlformats.org/officeDocument/2006/relationships">
-  <a:themeElements>
-    <a:clrScheme name="Default">
-      <a:dk1>
-        <a:srgbClr val="000000"/>
-      </a:dk1>
-      <a:lt1>
-        <a:srgbClr val="FFFFFF"/>
-      </a:lt1>
-      <a:dk2>
-        <a:srgbClr val="158158"/>
-      </a:dk2>
-      <a:lt2>
-        <a:srgbClr val="F3F3F3"/>
-      </a:lt2>
-      <a:accent1>
-        <a:srgbClr val="058DC7"/>
-      </a:accent1>
-      <a:accent2>
-        <a:srgbClr val="50B432"/>
-      </a:accent2>
-      <a:accent3>
-        <a:srgbClr val="ED561B"/>
-      </a:accent3>
-      <a:accent4>
-        <a:srgbClr val="EDEF00"/>
-      </a:accent4>
-      <a:accent5>
-        <a:srgbClr val="24CBE5"/>
-      </a:accent5>
-      <a:accent6>
-        <a:srgbClr val="64E572"/>
-      </a:accent6>
-      <a:hlink>
-        <a:srgbClr val="2200CC"/>
-      </a:hlink>
-      <a:folHlink>
-        <a:srgbClr val="551A8B"/>
-      </a:folHlink>
-    </a:clrScheme>
-    <a:fontScheme name="Office">
-      <a:majorFont>
-        <a:latin typeface="Arial"/>
-        <a:ea typeface=""/>
-        <a:cs typeface=""/>
-        <a:font script="Jpan" typeface="ＭＳ Ｐゴシック"/>
-        <a:font script="Hang" typeface="맑은 고딕"/>
-        <a:font script="Hans" typeface="宋体"/>
-        <a:font script="Hant" typeface="新細明體"/>
-        <a:font script="Arab" typeface="Times New Roman"/>
-        <a:font script="Hebr" typeface="Times New Roman"/>
-        <a:font script="Thai" typeface="Angsana New"/>
-        <a:font script="Ethi" typeface="Nyala"/>
-        <a:font script="Beng" typeface="Vrinda"/>
-        <a:font script="Gujr" typeface="Shruti"/>
-        <a:font script="Khmr" typeface="MoolBoran"/>
-        <a:font script="Knda" typeface="Tunga"/>
-        <a:font script="Guru" typeface="Raavi"/>
-        <a:font script="Cans" typeface="Euphemia"/>
-        <a:font script="Cher" typeface="Plantagenet Cherokee"/>
-        <a:font script="Yiii" typeface="Microsoft Yi Baiti"/>
-        <a:font script="Tibt" typeface="Microsoft Himalaya"/>
-        <a:font script="Thaa" typeface="MV Boli"/>
-        <a:font script="Deva" typeface="Mangal"/>
-        <a:font script="Telu" typeface="Gautami"/>
-        <a:font script="Taml" typeface="Latha"/>
-        <a:font script="Syrc" typeface="Estrangelo Edessa"/>
-        <a:font script="Orya" typeface="Kalinga"/>
-        <a:font script="Mlym" typeface="Kartika"/>
-        <a:font script="Laoo" typeface="DokChampa"/>
-        <a:font script="Sinh" typeface="Iskoola Pota"/>
-        <a:font script="Mong" typeface="Mongolian Baiti"/>
-        <a:font script="Viet" typeface="Times New Roman"/>
-        <a:font script="Uigh" typeface="Microsoft Uighur"/>
-        <a:font script="Geor" typeface="Sylfaen"/>
-      </a:majorFont>
-      <a:minorFont>
-        <a:latin typeface="Arial"/>
-        <a:ea typeface=""/>
-        <a:cs typeface=""/>
-        <a:font script="Jpan" typeface="ＭＳ Ｐゴシック"/>
-        <a:font script="Hang" typeface="맑은 고딕"/>
-        <a:font script="Hans" typeface="宋体"/>
-        <a:font script="Hant" typeface="新細明體"/>
-        <a:font script="Arab" typeface="Arial"/>
-        <a:font script="Hebr" typeface="Arial"/>
-        <a:font script="Thai" typeface="Cordia New"/>
-        <a:font script="Ethi" typeface="Nyala"/>
-        <a:font script="Beng" typeface="Vrinda"/>
-        <a:font script="Gujr" typeface="Shruti"/>
-        <a:font script="Khmr" typeface="DaunPenh"/>
-        <a:font script="Knda" typeface="Tunga"/>
-        <a:font script="Guru" typeface="Raavi"/>
-        <a:font script="Cans" typeface="Euphemia"/>
-        <a:font script="Cher" typeface="Plantagenet Cherokee"/>
-        <a:font script="Yiii" typeface="Microsoft Yi Baiti"/>
-        <a:font script="Tibt" typeface="Microsoft Himalaya"/>
-        <a:font script="Thaa" typeface="MV Boli"/>
-        <a:font script="Deva" typeface="Mangal"/>
-        <a:font script="Telu" typeface="Gautami"/>
-        <a:font script="Taml" typeface="Latha"/>
-        <a:font script="Syrc" typeface="Estrangelo Edessa"/>
-        <a:font script="Orya" typeface="Kalinga"/>
-        <a:font script="Mlym" typeface="Kartika"/>
-        <a:font script="Laoo" typeface="DokChampa"/>
-        <a:font script="Sinh" typeface="Iskoola Pota"/>
-        <a:font script="Mong" typeface="Mongolian Baiti"/>
-        <a:font script="Viet" typeface="Arial"/>
-        <a:font script="Uigh" typeface="Microsoft Uighur"/>
-        <a:font script="Geor" typeface="Sylfaen"/>
-      </a:minorFont>
-    </a:fontScheme>
-    <a:fmtScheme name="Office">
-      <a:fillStyleLst>
-        <a:solidFill>
-          <a:schemeClr val="phClr"/>
-        </a:solidFill>
-        <a:gradFill rotWithShape="1">
-          <a:gsLst>
-            <a:gs pos="0">
-              <a:schemeClr val="phClr">
-                <a:tint val="50000"/>
-                <a:satMod val="300000"/>
-              </a:schemeClr>
-            </a:gs>
-            <a:gs pos="35000">
-              <a:schemeClr val="phClr">
-                <a:tint val="37000"/>
-                <a:satMod val="300000"/>
-              </a:schemeClr>
-            </a:gs>
-            <a:gs pos="100000">
-              <a:schemeClr val="phClr">
-                <a:tint val="15000"/>
-                <a:satMod val="350000"/>
-              </a:schemeClr>
-            </a:gs>
-          </a:gsLst>
-          <a:lin ang="16200000" scaled="1"/>
-        </a:gradFill>
-        <a:gradFill rotWithShape="1">
-          <a:gsLst>
-            <a:gs pos="0">
-              <a:schemeClr val="phClr">
-                <a:tint val="100000"/>
-                <a:shade val="100000"/>
-                <a:satMod val="130000"/>
-              </a:schemeClr>
-            </a:gs>
-            <a:gs pos="100000">
-              <a:schemeClr val="phClr">
-                <a:tint val="50000"/>
-                <a:shade val="100000"/>
-                <a:satMod val="350000"/>
-              </a:schemeClr>
-            </a:gs>
-          </a:gsLst>
-          <a:lin ang="16200000" scaled="0"/>
-        </a:gradFill>
-      </a:fillStyleLst>
-      <a:lnStyleLst>
-        <a:ln w="9525" cap="flat" cmpd="sng" algn="ctr">
-          <a:solidFill>
-            <a:schemeClr val="phClr">
-              <a:shade val="95000"/>
-              <a:satMod val="105000"/>
-            </a:schemeClr>
-          </a:solidFill>
-          <a:prstDash val="solid"/>
-        </a:ln>
-        <a:ln w="25400" cap="flat" cmpd="sng" algn="ctr">
-          <a:solidFill>
-            <a:schemeClr val="phClr"/>
-          </a:solidFill>
-          <a:prstDash val="solid"/>
-        </a:ln>
-        <a:ln w="38100" cap="flat" cmpd="sng" algn="ctr">
-          <a:solidFill>
-            <a:schemeClr val="phClr"/>
-          </a:solidFill>
-          <a:prstDash val="solid"/>
-        </a:ln>
-      </a:lnStyleLst>
-      <a:effectStyleLst>
-        <a:effectStyle>
-          <a:effectLst>
-            <a:outerShdw blurRad="40000" dist="20000" dir="5400000" rotWithShape="0">
-              <a:srgbClr val="000000">
-                <a:alpha val="38000"/>
-              </a:srgbClr>
-            </a:outerShdw>
-          </a:effectLst>
-        </a:effectStyle>
-        <a:effectStyle>
-          <a:effectLst>
-            <a:outerShdw blurRad="40000" dist="23000" dir="5400000" rotWithShape="0">
-              <a:srgbClr val="000000">
-                <a:alpha val="35000"/>
-              </a:srgbClr>
-            </a:outerShdw>
-          </a:effectLst>
-        </a:effectStyle>
-        <a:effectStyle>
-          <a:effectLst>
-            <a:outerShdw blurRad="40000" dist="23000" dir="5400000" rotWithShape="0">
-              <a:srgbClr val="000000">
-                <a:alpha val="35000"/>
-              </a:srgbClr>
-            </a:outerShdw>
-          </a:effectLst>
-          <a:scene3d>
-            <a:camera prst="orthographicFront">
-              <a:rot lat="0" lon="0" rev="0"/>
-            </a:camera>
-            <a:lightRig rig="threePt" dir="t">
-              <a:rot lat="0" lon="0" rev="1200000"/>
-            </a:lightRig>
-          </a:scene3d>
-          <a:sp3d>
-            <a:bevelT w="63500" h="25400"/>
-          </a:sp3d>
-        </a:effectStyle>
-      </a:effectStyleLst>
-      <a:bgFillStyleLst>
-        <a:solidFill>
-          <a:schemeClr val="phClr"/>
-        </a:solidFill>
-        <a:gradFill rotWithShape="1">
-          <a:gsLst>
-            <a:gs pos="0">
-              <a:schemeClr val="phClr">
-                <a:tint val="40000"/>
-                <a:satMod val="350000"/>
-              </a:schemeClr>
-            </a:gs>
-            <a:gs pos="40000">
-              <a:schemeClr val="phClr">
-                <a:tint val="45000"/>
-                <a:shade val="99000"/>
-                <a:satMod val="350000"/>
-              </a:schemeClr>
-            </a:gs>
-            <a:gs pos="100000">
-              <a:schemeClr val="phClr">
-                <a:shade val="20000"/>
-                <a:satMod val="255000"/>
-              </a:schemeClr>
-            </a:gs>
-          </a:gsLst>
-          <a:path path="circle">
-            <a:fillToRect l="50000" t="-80000" r="50000" b="180000"/>
-          </a:path>
-        </a:gradFill>
-        <a:gradFill rotWithShape="1">
-          <a:gsLst>
-            <a:gs pos="0">
-              <a:schemeClr val="phClr">
-                <a:tint val="80000"/>
-                <a:satMod val="300000"/>
-              </a:schemeClr>
-            </a:gs>
-            <a:gs pos="100000">
-              <a:schemeClr val="phClr">
-                <a:shade val="30000"/>
-                <a:satMod val="200000"/>
-              </a:schemeClr>
-            </a:gs>
-          </a:gsLst>
-          <a:path path="circle">
-            <a:fillToRect l="50000" t="50000" r="50000" b="50000"/>
-          </a:path>
-        </a:gradFill>
-      </a:bgFillStyleLst>
-    </a:fmtScheme>
-  </a:themeElements>
-</a:theme>
 </file>
</xml_diff>